<commit_message>
renamed crop extension swift file, fixed some of the referencing between vc and skscene. now only lets face be valid if a face is detected too
</commit_message>
<xml_diff>
--- a/docs/AI Hackathon - Presentation.pptx
+++ b/docs/AI Hackathon - Presentation.pptx
@@ -8985,16 +8985,7 @@
                 </a:solidFill>
                 <a:latin typeface="Berlin Sans FB" panose="020E0602020502020306" pitchFamily="34" charset="0"/>
               </a:rPr>
-              <a:t>Face </a:t>
-            </a:r>
-            <a:r>
-              <a:rPr lang="en-GB" sz="2000" smtClean="0">
-                <a:solidFill>
-                  <a:schemeClr val="bg1"/>
-                </a:solidFill>
-                <a:latin typeface="Berlin Sans FB" panose="020E0602020502020306" pitchFamily="34" charset="0"/>
-              </a:rPr>
-              <a:t>Detection using Core Image (iOS)</a:t>
+              <a:t>Face Detection using Core Image (iOS)</a:t>
             </a:r>
             <a:endParaRPr lang="en-GB" sz="2000" dirty="0">
               <a:solidFill>
@@ -9078,25 +9069,7 @@
                   </a:solidFill>
                   <a:latin typeface="Berlin Sans FB" panose="020E0602020502020306" pitchFamily="34" charset="0"/>
                 </a:rPr>
-                <a:t>{0.05, 0.05</a:t>
-              </a:r>
-              <a:r>
-                <a:rPr lang="en-GB" sz="1800" dirty="0" smtClean="0">
-                  <a:solidFill>
-                    <a:schemeClr val="bg1"/>
-                  </a:solidFill>
-                  <a:latin typeface="Berlin Sans FB" panose="020E0602020502020306" pitchFamily="34" charset="0"/>
-                </a:rPr>
-                <a:t>,  0.7, 0.09, </a:t>
-              </a:r>
-              <a:r>
-                <a:rPr lang="en-GB" sz="1800" dirty="0" smtClean="0">
-                  <a:solidFill>
-                    <a:schemeClr val="bg1"/>
-                  </a:solidFill>
-                  <a:latin typeface="Berlin Sans FB" panose="020E0602020502020306" pitchFamily="34" charset="0"/>
-                </a:rPr>
-                <a:t>0.01, 0.2}</a:t>
+                <a:t>{0.05, 0.05,  0.7, 0.09, 0.01, 0.2}</a:t>
               </a:r>
               <a:endParaRPr lang="en-GB" sz="1800" dirty="0">
                 <a:solidFill>
@@ -10248,55 +10221,7 @@
                 <a:cs typeface="Exo 2"/>
                 <a:sym typeface="Exo 2"/>
               </a:rPr>
-              <a:t>&gt; </a:t>
-            </a:r>
-            <a:r>
-              <a:rPr lang="en-GB" sz="2200" dirty="0" smtClean="0">
-                <a:solidFill>
-                  <a:schemeClr val="lt1"/>
-                </a:solidFill>
-                <a:latin typeface="Berlin Sans FB" panose="020E0602020502020306" pitchFamily="34" charset="0"/>
-                <a:ea typeface="Exo 2"/>
-                <a:cs typeface="Exo 2"/>
-                <a:sym typeface="Exo 2"/>
-              </a:rPr>
-              <a:t>already setup server</a:t>
-            </a:r>
-            <a:r>
-              <a:rPr lang="en-GB" sz="2200" dirty="0" smtClean="0">
-                <a:solidFill>
-                  <a:schemeClr val="lt1"/>
-                </a:solidFill>
-                <a:latin typeface="Berlin Sans FB" panose="020E0602020502020306" pitchFamily="34" charset="0"/>
-                <a:ea typeface="Exo 2"/>
-                <a:cs typeface="Exo 2"/>
-                <a:sym typeface="Exo 2"/>
-              </a:rPr>
-              <a:t> with</a:t>
-            </a:r>
-            <a:r>
-              <a:rPr lang="en-GB" sz="2200" dirty="0" smtClean="0">
-                <a:solidFill>
-                  <a:schemeClr val="lt1"/>
-                </a:solidFill>
-                <a:latin typeface="Berlin Sans FB" panose="020E0602020502020306" pitchFamily="34" charset="0"/>
-                <a:ea typeface="Exo 2"/>
-                <a:cs typeface="Exo 2"/>
-                <a:sym typeface="Exo 2"/>
-              </a:rPr>
-              <a:t> REST </a:t>
-            </a:r>
-            <a:r>
-              <a:rPr lang="en-GB" sz="2200" dirty="0" smtClean="0">
-                <a:solidFill>
-                  <a:schemeClr val="lt1"/>
-                </a:solidFill>
-                <a:latin typeface="Berlin Sans FB" panose="020E0602020502020306" pitchFamily="34" charset="0"/>
-                <a:ea typeface="Exo 2"/>
-                <a:cs typeface="Exo 2"/>
-                <a:sym typeface="Exo 2"/>
-              </a:rPr>
-              <a:t>API</a:t>
+              <a:t>&gt; already setup server with REST API</a:t>
             </a:r>
           </a:p>
           <a:p>
@@ -10406,7 +10331,31 @@
                 <a:cs typeface="Exo 2"/>
                 <a:sym typeface="Exo 2"/>
               </a:rPr>
-              <a:t>3) Android/Windows codebase</a:t>
+              <a:t>3) </a:t>
+            </a:r>
+            <a:r>
+              <a:rPr lang="en-GB" sz="2000" b="0" i="0" u="none" strike="noStrike" cap="none" dirty="0" smtClean="0">
+                <a:solidFill>
+                  <a:schemeClr val="lt1"/>
+                </a:solidFill>
+                <a:latin typeface="Berlin Sans FB" panose="020E0602020502020306" pitchFamily="34" charset="0"/>
+                <a:ea typeface="Exo 2"/>
+                <a:cs typeface="Exo 2"/>
+                <a:sym typeface="Exo 2"/>
+              </a:rPr>
+              <a:t>Android/Windows phone </a:t>
+            </a:r>
+            <a:r>
+              <a:rPr lang="en-GB" sz="2000" b="0" i="0" u="none" strike="noStrike" cap="none" dirty="0" smtClean="0">
+                <a:solidFill>
+                  <a:schemeClr val="lt1"/>
+                </a:solidFill>
+                <a:latin typeface="Berlin Sans FB" panose="020E0602020502020306" pitchFamily="34" charset="0"/>
+                <a:ea typeface="Exo 2"/>
+                <a:cs typeface="Exo 2"/>
+                <a:sym typeface="Exo 2"/>
+              </a:rPr>
+              <a:t>codebase</a:t>
             </a:r>
             <a:endParaRPr lang="en-GB" sz="1200" dirty="0">
               <a:solidFill>
@@ -12113,17 +12062,7 @@
                 <a:latin typeface="Berlin Sans FB" panose="020E0602020502020306" pitchFamily="34" charset="0"/>
                 <a:sym typeface="Exo 2"/>
               </a:rPr>
-              <a:t>Most </a:t>
-            </a:r>
-            <a:r>
-              <a:rPr lang="en-GB" sz="2200" dirty="0" smtClean="0">
-                <a:solidFill>
-                  <a:schemeClr val="bg1"/>
-                </a:solidFill>
-                <a:latin typeface="Berlin Sans FB" panose="020E0602020502020306" pitchFamily="34" charset="0"/>
-                <a:sym typeface="Exo 2"/>
-              </a:rPr>
-              <a:t>importantly: Have fun!</a:t>
+              <a:t>Most importantly: Have fun!</a:t>
             </a:r>
           </a:p>
           <a:p>
@@ -12146,11 +12085,11 @@
   <p:clrMapOvr>
     <a:masterClrMapping/>
   </p:clrMapOvr>
-  <mc:AlternateContent xmlns:mc="http://schemas.openxmlformats.org/markup-compatibility/2006">
-    <mc:Choice xmlns:p14="http://schemas.microsoft.com/office/powerpoint/2010/main" Requires="p14">
+  <mc:AlternateContent xmlns:mc="http://schemas.openxmlformats.org/markup-compatibility/2006" xmlns:p14="http://schemas.microsoft.com/office/powerpoint/2010/main">
+    <mc:Choice Requires="p14">
       <p:transition spd="slow" p14:dur="2000"/>
     </mc:Choice>
-    <mc:Fallback>
+    <mc:Fallback xmlns="">
       <p:transition spd="slow"/>
     </mc:Fallback>
   </mc:AlternateContent>
@@ -12376,41 +12315,8 @@
                 <a:cs typeface="Exo 2"/>
                 <a:sym typeface="Exo 2"/>
               </a:rPr>
-              <a:t>mileys </a:t>
+              <a:t>mileys flow down the screen -mimic them </a:t>
             </a:r>
-            <a:r>
-              <a:rPr lang="en-GB" sz="2200" b="0" i="0" u="none" strike="noStrike" cap="none" dirty="0" smtClean="0">
-                <a:solidFill>
-                  <a:schemeClr val="lt1"/>
-                </a:solidFill>
-                <a:latin typeface="Berlin Sans FB" panose="020E0602020502020306" pitchFamily="34" charset="0"/>
-                <a:ea typeface="Exo 2"/>
-                <a:cs typeface="Exo 2"/>
-                <a:sym typeface="Exo 2"/>
-              </a:rPr>
-              <a:t>flow down the </a:t>
-            </a:r>
-            <a:r>
-              <a:rPr lang="en-GB" sz="2200" b="0" i="0" u="none" strike="noStrike" cap="none" dirty="0" smtClean="0">
-                <a:solidFill>
-                  <a:schemeClr val="lt1"/>
-                </a:solidFill>
-                <a:latin typeface="Berlin Sans FB" panose="020E0602020502020306" pitchFamily="34" charset="0"/>
-                <a:ea typeface="Exo 2"/>
-                <a:cs typeface="Exo 2"/>
-                <a:sym typeface="Exo 2"/>
-              </a:rPr>
-              <a:t>screen -mimic them </a:t>
-            </a:r>
-            <a:endParaRPr lang="en-GB" sz="2200" b="0" i="0" u="none" strike="noStrike" cap="none" dirty="0" smtClean="0">
-              <a:solidFill>
-                <a:schemeClr val="lt1"/>
-              </a:solidFill>
-              <a:latin typeface="Berlin Sans FB" panose="020E0602020502020306" pitchFamily="34" charset="0"/>
-              <a:ea typeface="Exo 2"/>
-              <a:cs typeface="Exo 2"/>
-              <a:sym typeface="Exo 2"/>
-            </a:endParaRPr>
           </a:p>
           <a:p>
             <a:pPr marR="0" lvl="0" algn="l" rtl="0">
@@ -12464,19 +12370,7 @@
                 <a:cs typeface="Exo 2"/>
                 <a:sym typeface="Exo 2"/>
               </a:rPr>
-              <a:t>Score </a:t>
-            </a:r>
-            <a:r>
-              <a:rPr lang="en-GB" sz="2200" b="0" i="0" u="none" strike="noStrike" cap="none" dirty="0" smtClean="0">
-                <a:solidFill>
-                  <a:schemeClr val="lt1"/>
-                </a:solidFill>
-                <a:latin typeface="Berlin Sans FB" panose="020E0602020502020306" pitchFamily="34" charset="0"/>
-                <a:ea typeface="Exo 2"/>
-                <a:cs typeface="Exo 2"/>
-                <a:sym typeface="Exo 2"/>
-              </a:rPr>
-              <a:t>points on our </a:t>
+              <a:t>Score points on our </a:t>
             </a:r>
             <a:r>
               <a:rPr lang="en-GB" sz="2200" b="0" i="0" u="none" strike="noStrike" cap="none" dirty="0" err="1" smtClean="0">
@@ -13919,16 +13813,7 @@
                 </a:solidFill>
                 <a:latin typeface="Berlin Sans FB" panose="020E0602020502020306" pitchFamily="34" charset="0"/>
               </a:rPr>
-              <a:t>DEEP LEARNING </a:t>
-            </a:r>
-            <a:r>
-              <a:rPr lang="en-GB" sz="2200" dirty="0" smtClean="0">
-                <a:solidFill>
-                  <a:schemeClr val="bg1"/>
-                </a:solidFill>
-                <a:latin typeface="Berlin Sans FB" panose="020E0602020502020306" pitchFamily="34" charset="0"/>
-              </a:rPr>
-              <a:t>CONVOLUTION</a:t>
+              <a:t>DEEP LEARNING CONVOLUTION</a:t>
             </a:r>
           </a:p>
           <a:p>
@@ -13940,25 +13825,7 @@
                 </a:solidFill>
                 <a:latin typeface="Berlin Sans FB" panose="020E0602020502020306" pitchFamily="34" charset="0"/>
               </a:rPr>
-              <a:t>NEURAL</a:t>
-            </a:r>
-            <a:r>
-              <a:rPr lang="en-GB" sz="2200" dirty="0" smtClean="0">
-                <a:solidFill>
-                  <a:schemeClr val="bg1"/>
-                </a:solidFill>
-                <a:latin typeface="Berlin Sans FB" panose="020E0602020502020306" pitchFamily="34" charset="0"/>
-              </a:rPr>
-              <a:t> </a:t>
-            </a:r>
-            <a:r>
-              <a:rPr lang="en-GB" sz="2200" dirty="0" smtClean="0">
-                <a:solidFill>
-                  <a:schemeClr val="bg1"/>
-                </a:solidFill>
-                <a:latin typeface="Berlin Sans FB" panose="020E0602020502020306" pitchFamily="34" charset="0"/>
-              </a:rPr>
-              <a:t>NETWORK</a:t>
+              <a:t>NEURAL NETWORK</a:t>
             </a:r>
             <a:endParaRPr lang="en-GB" sz="2200" dirty="0">
               <a:solidFill>

</xml_diff>